<commit_message>
Question? use bigger font
</commit_message>
<xml_diff>
--- a/Apple.pptx
+++ b/Apple.pptx
@@ -123,7 +123,7 @@
 <file path=ppt/revisionInfo.xml><?xml version="1.0" encoding="utf-8"?>
 <p1510:revInfo xmlns:a="http://schemas.openxmlformats.org/drawingml/2006/main" xmlns:r="http://schemas.openxmlformats.org/officeDocument/2006/relationships" xmlns:p1510="http://schemas.microsoft.com/office/powerpoint/2015/10/main">
   <p1510:revLst>
-    <p1510:client id="{0232BF0C-9F56-1344-833A-0F67DFC1ADF9}" v="2" dt="2024-11-06T01:15:58.531"/>
+    <p1510:client id="{0232BF0C-9F56-1344-833A-0F67DFC1ADF9}" v="5" dt="2024-11-06T01:28:22.309"/>
     <p1510:client id="{E5C91240-D7CD-4453-9A63-0A14FF3FE52D}" v="46" dt="2024-11-05T16:25:51.337"/>
   </p1510:revLst>
 </p1510:revInfo>
@@ -492,7 +492,7 @@
   <pc:docChgLst>
     <pc:chgData name="王国霖WANG GUOLIN" userId="fea05601-d3b0-4e80-a8ef-a9569ce1debe" providerId="ADAL" clId="{0232BF0C-9F56-1344-833A-0F67DFC1ADF9}"/>
     <pc:docChg chg="modSld">
-      <pc:chgData name="王国霖WANG GUOLIN" userId="fea05601-d3b0-4e80-a8ef-a9569ce1debe" providerId="ADAL" clId="{0232BF0C-9F56-1344-833A-0F67DFC1ADF9}" dt="2024-11-06T01:15:58.531" v="1" actId="1076"/>
+      <pc:chgData name="王国霖WANG GUOLIN" userId="fea05601-d3b0-4e80-a8ef-a9569ce1debe" providerId="ADAL" clId="{0232BF0C-9F56-1344-833A-0F67DFC1ADF9}" dt="2024-11-06T01:28:22.309" v="4" actId="1076"/>
       <pc:docMkLst>
         <pc:docMk/>
       </pc:docMkLst>
@@ -510,6 +510,21 @@
             <ac:picMk id="4" creationId="{BAB7F604-C19E-CD75-1F80-41CBC40CDA89}"/>
           </ac:picMkLst>
         </pc:picChg>
+      </pc:sldChg>
+      <pc:sldChg chg="modSp mod">
+        <pc:chgData name="王国霖WANG GUOLIN" userId="fea05601-d3b0-4e80-a8ef-a9569ce1debe" providerId="ADAL" clId="{0232BF0C-9F56-1344-833A-0F67DFC1ADF9}" dt="2024-11-06T01:28:22.309" v="4" actId="1076"/>
+        <pc:sldMkLst>
+          <pc:docMk/>
+          <pc:sldMk cId="765475836" sldId="262"/>
+        </pc:sldMkLst>
+        <pc:spChg chg="mod">
+          <ac:chgData name="王国霖WANG GUOLIN" userId="fea05601-d3b0-4e80-a8ef-a9569ce1debe" providerId="ADAL" clId="{0232BF0C-9F56-1344-833A-0F67DFC1ADF9}" dt="2024-11-06T01:28:22.309" v="4" actId="1076"/>
+          <ac:spMkLst>
+            <pc:docMk/>
+            <pc:sldMk cId="765475836" sldId="262"/>
+            <ac:spMk id="4" creationId="{B60596C8-6163-0BB3-C19B-7885B388FDCF}"/>
+          </ac:spMkLst>
+        </pc:spChg>
       </pc:sldChg>
     </pc:docChg>
   </pc:docChgLst>
@@ -6299,8 +6314,8 @@
         </p:nvSpPr>
         <p:spPr>
           <a:xfrm>
-            <a:off x="4658747" y="3075057"/>
-            <a:ext cx="2937022" cy="707886"/>
+            <a:off x="3939800" y="2921168"/>
+            <a:ext cx="4312399" cy="1015663"/>
           </a:xfrm>
           <a:prstGeom prst="rect">
             <a:avLst/>
@@ -6314,7 +6329,7 @@
           <a:lstStyle/>
           <a:p>
             <a:r>
-              <a:rPr lang="en-HK" altLang="zh-CN" sz="4000" b="1">
+              <a:rPr lang="en-HK" altLang="zh-CN" sz="6000" b="1" dirty="0">
                 <a:gradFill>
                   <a:gsLst>
                     <a:gs pos="0">
@@ -6349,7 +6364,7 @@
               </a:rPr>
               <a:t>Questions?</a:t>
             </a:r>
-            <a:endParaRPr lang="zh-CN" altLang="en-US" sz="4000" b="1">
+            <a:endParaRPr lang="zh-CN" altLang="en-US" sz="6000" b="1" dirty="0">
               <a:gradFill>
                 <a:gsLst>
                   <a:gs pos="0">

</xml_diff>

<commit_message>
Reduce the number of characters In page 4
</commit_message>
<xml_diff>
--- a/Apple.pptx
+++ b/Apple.pptx
@@ -123,7 +123,7 @@
 <file path=ppt/revisionInfo.xml><?xml version="1.0" encoding="utf-8"?>
 <p1510:revInfo xmlns:a="http://schemas.openxmlformats.org/drawingml/2006/main" xmlns:r="http://schemas.openxmlformats.org/officeDocument/2006/relationships" xmlns:p1510="http://schemas.microsoft.com/office/powerpoint/2015/10/main">
   <p1510:revLst>
-    <p1510:client id="{0232BF0C-9F56-1344-833A-0F67DFC1ADF9}" v="5" dt="2024-11-06T01:28:22.309"/>
+    <p1510:client id="{0232BF0C-9F56-1344-833A-0F67DFC1ADF9}" v="9" dt="2024-11-06T01:55:59.468"/>
     <p1510:client id="{E5C91240-D7CD-4453-9A63-0A14FF3FE52D}" v="46" dt="2024-11-05T16:25:51.337"/>
   </p1510:revLst>
 </p1510:revInfo>
@@ -492,7 +492,7 @@
   <pc:docChgLst>
     <pc:chgData name="王国霖WANG GUOLIN" userId="fea05601-d3b0-4e80-a8ef-a9569ce1debe" providerId="ADAL" clId="{0232BF0C-9F56-1344-833A-0F67DFC1ADF9}"/>
     <pc:docChg chg="modSld">
-      <pc:chgData name="王国霖WANG GUOLIN" userId="fea05601-d3b0-4e80-a8ef-a9569ce1debe" providerId="ADAL" clId="{0232BF0C-9F56-1344-833A-0F67DFC1ADF9}" dt="2024-11-06T01:28:22.309" v="4" actId="1076"/>
+      <pc:chgData name="王国霖WANG GUOLIN" userId="fea05601-d3b0-4e80-a8ef-a9569ce1debe" providerId="ADAL" clId="{0232BF0C-9F56-1344-833A-0F67DFC1ADF9}" dt="2024-11-06T01:55:59.468" v="8" actId="20577"/>
       <pc:docMkLst>
         <pc:docMk/>
       </pc:docMkLst>
@@ -523,6 +523,29 @@
             <pc:docMk/>
             <pc:sldMk cId="765475836" sldId="262"/>
             <ac:spMk id="4" creationId="{B60596C8-6163-0BB3-C19B-7885B388FDCF}"/>
+          </ac:spMkLst>
+        </pc:spChg>
+      </pc:sldChg>
+      <pc:sldChg chg="modSp mod">
+        <pc:chgData name="王国霖WANG GUOLIN" userId="fea05601-d3b0-4e80-a8ef-a9569ce1debe" providerId="ADAL" clId="{0232BF0C-9F56-1344-833A-0F67DFC1ADF9}" dt="2024-11-06T01:55:59.468" v="8" actId="20577"/>
+        <pc:sldMkLst>
+          <pc:docMk/>
+          <pc:sldMk cId="2166809759" sldId="268"/>
+        </pc:sldMkLst>
+        <pc:spChg chg="mod">
+          <ac:chgData name="王国霖WANG GUOLIN" userId="fea05601-d3b0-4e80-a8ef-a9569ce1debe" providerId="ADAL" clId="{0232BF0C-9F56-1344-833A-0F67DFC1ADF9}" dt="2024-11-06T01:55:59.468" v="8" actId="20577"/>
+          <ac:spMkLst>
+            <pc:docMk/>
+            <pc:sldMk cId="2166809759" sldId="268"/>
+            <ac:spMk id="5" creationId="{8B079CA8-1B68-367D-BB39-E9775372F936}"/>
+          </ac:spMkLst>
+        </pc:spChg>
+        <pc:spChg chg="mod">
+          <ac:chgData name="王国霖WANG GUOLIN" userId="fea05601-d3b0-4e80-a8ef-a9569ce1debe" providerId="ADAL" clId="{0232BF0C-9F56-1344-833A-0F67DFC1ADF9}" dt="2024-11-06T01:55:45.160" v="7" actId="20577"/>
+          <ac:spMkLst>
+            <pc:docMk/>
+            <pc:sldMk cId="2166809759" sldId="268"/>
+            <ac:spMk id="6" creationId="{7C2FB0A3-AC5E-F92D-1DC1-30CFAD4C189B}"/>
           </ac:spMkLst>
         </pc:spChg>
       </pc:sldChg>
@@ -5981,7 +6004,7 @@
         <p:spPr>
           <a:xfrm>
             <a:off x="2227941" y="2460703"/>
-            <a:ext cx="4986314" cy="1200329"/>
+            <a:ext cx="4986314" cy="646331"/>
           </a:xfrm>
           <a:prstGeom prst="rect">
             <a:avLst/>
@@ -6012,6 +6035,76 @@
               <a:defRPr/>
             </a:pPr>
             <a:r>
+              <a:rPr lang="zh-CN" altLang="en-US" dirty="0">
+                <a:solidFill>
+                  <a:schemeClr val="bg1"/>
+                </a:solidFill>
+                <a:latin typeface="Microsoft JhengHei" panose="020B0604030504040204" pitchFamily="34" charset="-120"/>
+                <a:ea typeface="Microsoft JhengHei" panose="020B0604030504040204" pitchFamily="34" charset="-120"/>
+              </a:rPr>
+              <a:t>蘋果的</a:t>
+            </a:r>
+            <a:r>
+              <a:rPr lang="en-US" altLang="zh-CN" dirty="0">
+                <a:solidFill>
+                  <a:schemeClr val="bg1"/>
+                </a:solidFill>
+                <a:latin typeface="Microsoft JhengHei" panose="020B0604030504040204" pitchFamily="34" charset="-120"/>
+                <a:ea typeface="Microsoft JhengHei" panose="020B0604030504040204" pitchFamily="34" charset="-120"/>
+              </a:rPr>
+              <a:t>M</a:t>
+            </a:r>
+            <a:r>
+              <a:rPr lang="zh-CN" altLang="en-US" dirty="0">
+                <a:solidFill>
+                  <a:schemeClr val="bg1"/>
+                </a:solidFill>
+                <a:latin typeface="Microsoft JhengHei" panose="020B0604030504040204" pitchFamily="34" charset="-120"/>
+                <a:ea typeface="Microsoft JhengHei" panose="020B0604030504040204" pitchFamily="34" charset="-120"/>
+              </a:rPr>
+              <a:t>系列晶片基於</a:t>
+            </a:r>
+            <a:r>
+              <a:rPr lang="en-US" altLang="zh-CN" dirty="0">
+                <a:solidFill>
+                  <a:schemeClr val="bg1"/>
+                </a:solidFill>
+                <a:latin typeface="Microsoft JhengHei" panose="020B0604030504040204" pitchFamily="34" charset="-120"/>
+                <a:ea typeface="Microsoft JhengHei" panose="020B0604030504040204" pitchFamily="34" charset="-120"/>
+              </a:rPr>
+              <a:t>ARM</a:t>
+            </a:r>
+            <a:r>
+              <a:rPr lang="zh-CN" altLang="en-US" dirty="0">
+                <a:solidFill>
+                  <a:schemeClr val="bg1"/>
+                </a:solidFill>
+                <a:latin typeface="Microsoft JhengHei" panose="020B0604030504040204" pitchFamily="34" charset="-120"/>
+                <a:ea typeface="Microsoft JhengHei" panose="020B0604030504040204" pitchFamily="34" charset="-120"/>
+              </a:rPr>
+              <a:t>架構，借助台積電先進的</a:t>
+            </a:r>
+            <a:r>
+              <a:rPr lang="en-US" altLang="zh-CN" dirty="0">
+                <a:solidFill>
+                  <a:schemeClr val="bg1"/>
+                </a:solidFill>
+                <a:latin typeface="Microsoft JhengHei" panose="020B0604030504040204" pitchFamily="34" charset="-120"/>
+                <a:ea typeface="Microsoft JhengHei" panose="020B0604030504040204" pitchFamily="34" charset="-120"/>
+              </a:rPr>
+              <a:t>3</a:t>
+            </a:r>
+            <a:r>
+              <a:rPr lang="zh-CN" altLang="en-US" dirty="0">
+                <a:solidFill>
+                  <a:schemeClr val="bg1"/>
+                </a:solidFill>
+                <a:latin typeface="Microsoft JhengHei" panose="020B0604030504040204" pitchFamily="34" charset="-120"/>
+                <a:ea typeface="Microsoft JhengHei" panose="020B0604030504040204" pitchFamily="34" charset="-120"/>
+              </a:rPr>
+              <a:t>納米制程工藝，顯著提升了</a:t>
+            </a:r>
+            <a:r>
               <a:rPr lang="zh-CN" altLang="en-US">
                 <a:solidFill>
                   <a:schemeClr val="bg1"/>
@@ -6019,89 +6112,9 @@
                 <a:latin typeface="Microsoft JhengHei" panose="020B0604030504040204" pitchFamily="34" charset="-120"/>
                 <a:ea typeface="Microsoft JhengHei" panose="020B0604030504040204" pitchFamily="34" charset="-120"/>
               </a:rPr>
-              <a:t>蘋果的</a:t>
-            </a:r>
-            <a:r>
-              <a:rPr lang="en-US" altLang="zh-CN">
-                <a:solidFill>
-                  <a:schemeClr val="bg1"/>
-                </a:solidFill>
-                <a:latin typeface="Microsoft JhengHei" panose="020B0604030504040204" pitchFamily="34" charset="-120"/>
-                <a:ea typeface="Microsoft JhengHei" panose="020B0604030504040204" pitchFamily="34" charset="-120"/>
-              </a:rPr>
-              <a:t>M</a:t>
-            </a:r>
-            <a:r>
-              <a:rPr lang="zh-CN" altLang="en-US">
-                <a:solidFill>
-                  <a:schemeClr val="bg1"/>
-                </a:solidFill>
-                <a:latin typeface="Microsoft JhengHei" panose="020B0604030504040204" pitchFamily="34" charset="-120"/>
-                <a:ea typeface="Microsoft JhengHei" panose="020B0604030504040204" pitchFamily="34" charset="-120"/>
-              </a:rPr>
-              <a:t>系列晶片基於</a:t>
-            </a:r>
-            <a:r>
-              <a:rPr lang="en-US" altLang="zh-CN">
-                <a:solidFill>
-                  <a:schemeClr val="bg1"/>
-                </a:solidFill>
-                <a:latin typeface="Microsoft JhengHei" panose="020B0604030504040204" pitchFamily="34" charset="-120"/>
-                <a:ea typeface="Microsoft JhengHei" panose="020B0604030504040204" pitchFamily="34" charset="-120"/>
-              </a:rPr>
-              <a:t>ARM</a:t>
-            </a:r>
-            <a:r>
-              <a:rPr lang="zh-CN" altLang="en-US">
-                <a:solidFill>
-                  <a:schemeClr val="bg1"/>
-                </a:solidFill>
-                <a:latin typeface="Microsoft JhengHei" panose="020B0604030504040204" pitchFamily="34" charset="-120"/>
-                <a:ea typeface="Microsoft JhengHei" panose="020B0604030504040204" pitchFamily="34" charset="-120"/>
-              </a:rPr>
-              <a:t>架構，借助台積電先進的制程工藝，從</a:t>
-            </a:r>
-            <a:r>
-              <a:rPr lang="en-US" altLang="zh-CN">
-                <a:solidFill>
-                  <a:schemeClr val="bg1"/>
-                </a:solidFill>
-                <a:latin typeface="Microsoft JhengHei" panose="020B0604030504040204" pitchFamily="34" charset="-120"/>
-                <a:ea typeface="Microsoft JhengHei" panose="020B0604030504040204" pitchFamily="34" charset="-120"/>
-              </a:rPr>
-              <a:t>5</a:t>
-            </a:r>
-            <a:r>
-              <a:rPr lang="zh-CN" altLang="en-US">
-                <a:solidFill>
-                  <a:schemeClr val="bg1"/>
-                </a:solidFill>
-                <a:latin typeface="Microsoft JhengHei" panose="020B0604030504040204" pitchFamily="34" charset="-120"/>
-                <a:ea typeface="Microsoft JhengHei" panose="020B0604030504040204" pitchFamily="34" charset="-120"/>
-              </a:rPr>
-              <a:t>納米發展到最新的</a:t>
-            </a:r>
-            <a:r>
-              <a:rPr lang="en-US" altLang="zh-CN">
-                <a:solidFill>
-                  <a:schemeClr val="bg1"/>
-                </a:solidFill>
-                <a:latin typeface="Microsoft JhengHei" panose="020B0604030504040204" pitchFamily="34" charset="-120"/>
-                <a:ea typeface="Microsoft JhengHei" panose="020B0604030504040204" pitchFamily="34" charset="-120"/>
-              </a:rPr>
-              <a:t>3</a:t>
-            </a:r>
-            <a:r>
-              <a:rPr lang="zh-CN" altLang="en-US">
-                <a:solidFill>
-                  <a:schemeClr val="bg1"/>
-                </a:solidFill>
-                <a:latin typeface="Microsoft JhengHei" panose="020B0604030504040204" pitchFamily="34" charset="-120"/>
-                <a:ea typeface="Microsoft JhengHei" panose="020B0604030504040204" pitchFamily="34" charset="-120"/>
-              </a:rPr>
-              <a:t>納米，顯著提升了晶片性能，推動了個人計算設備在性能和能效上的革命。</a:t>
-            </a:r>
-            <a:endParaRPr kumimoji="0" lang="zh-CN" altLang="en-US" sz="1800" b="1" i="0" u="none" strike="noStrike" kern="1200" cap="none" spc="0" normalizeH="0" baseline="0" noProof="0">
+              <a:t>晶片性能。</a:t>
+            </a:r>
+            <a:endParaRPr kumimoji="0" lang="zh-CN" altLang="en-US" sz="1800" b="1" i="0" u="none" strike="noStrike" kern="1200" cap="none" spc="0" normalizeH="0" baseline="0" noProof="0" dirty="0">
               <a:ln>
                 <a:noFill/>
               </a:ln>
@@ -6132,7 +6145,7 @@
         <p:spPr>
           <a:xfrm>
             <a:off x="2227941" y="4580646"/>
-            <a:ext cx="4923708" cy="1477328"/>
+            <a:ext cx="4923708" cy="1200329"/>
           </a:xfrm>
           <a:prstGeom prst="rect">
             <a:avLst/>
@@ -6146,7 +6159,7 @@
           <a:lstStyle/>
           <a:p>
             <a:br>
-              <a:rPr lang="en-US" altLang="zh-CN">
+              <a:rPr lang="en-US" altLang="zh-CN" dirty="0">
                 <a:solidFill>
                   <a:schemeClr val="bg1"/>
                 </a:solidFill>
@@ -6155,7 +6168,7 @@
               </a:rPr>
             </a:br>
             <a:r>
-              <a:rPr lang="en-US" altLang="zh-CN">
+              <a:rPr lang="en-US" altLang="zh-CN" dirty="0">
                 <a:solidFill>
                   <a:schemeClr val="bg1"/>
                 </a:solidFill>
@@ -6165,37 +6178,17 @@
               <a:t>M</a:t>
             </a:r>
             <a:r>
-              <a:rPr lang="zh-CN" altLang="en-US">
+              <a:rPr lang="zh-CN" altLang="en-US" dirty="0">
                 <a:solidFill>
                   <a:schemeClr val="bg1"/>
                 </a:solidFill>
                 <a:latin typeface="Microsoft JhengHei" panose="020B0604030504040204" pitchFamily="34" charset="-120"/>
                 <a:ea typeface="Microsoft JhengHei" panose="020B0604030504040204" pitchFamily="34" charset="-120"/>
               </a:rPr>
-              <a:t>系列晶片是蘋果自研的基於</a:t>
-            </a:r>
-            <a:r>
-              <a:rPr lang="en-US" altLang="zh-CN">
-                <a:solidFill>
-                  <a:schemeClr val="bg1"/>
-                </a:solidFill>
-                <a:latin typeface="Microsoft JhengHei" panose="020B0604030504040204" pitchFamily="34" charset="-120"/>
-                <a:ea typeface="Microsoft JhengHei" panose="020B0604030504040204" pitchFamily="34" charset="-120"/>
-              </a:rPr>
-              <a:t>ARM</a:t>
-            </a:r>
-            <a:r>
-              <a:rPr lang="zh-CN" altLang="en-US">
-                <a:solidFill>
-                  <a:schemeClr val="bg1"/>
-                </a:solidFill>
-                <a:latin typeface="Microsoft JhengHei" panose="020B0604030504040204" pitchFamily="34" charset="-120"/>
-                <a:ea typeface="Microsoft JhengHei" panose="020B0604030504040204" pitchFamily="34" charset="-120"/>
-              </a:rPr>
-              <a:t>架構的系統級晶片，自</a:t>
-            </a:r>
-            <a:r>
-              <a:rPr lang="en-US" altLang="zh-CN">
+              <a:t>系列晶片自</a:t>
+            </a:r>
+            <a:r>
+              <a:rPr lang="en-US" altLang="zh-CN" dirty="0">
                 <a:solidFill>
                   <a:schemeClr val="bg1"/>
                 </a:solidFill>
@@ -6205,7 +6198,7 @@
               <a:t>2020</a:t>
             </a:r>
             <a:r>
-              <a:rPr lang="zh-CN" altLang="en-US">
+              <a:rPr lang="zh-CN" altLang="en-US" dirty="0">
                 <a:solidFill>
                   <a:schemeClr val="bg1"/>
                 </a:solidFill>
@@ -6214,7 +6207,7 @@
               </a:rPr>
               <a:t>年發佈以來，以高能效比和出色的性能引領電腦處理器市場。</a:t>
             </a:r>
-            <a:endParaRPr kumimoji="0" lang="zh-CN" altLang="en-US" sz="1800" b="1" i="0" u="none" strike="noStrike" kern="1200" cap="none" spc="0" normalizeH="0" baseline="0" noProof="0">
+            <a:endParaRPr kumimoji="0" lang="zh-CN" altLang="en-US" sz="1800" b="1" i="0" u="none" strike="noStrike" kern="1200" cap="none" spc="0" normalizeH="0" baseline="0" noProof="0" dirty="0">
               <a:ln>
                 <a:noFill/>
               </a:ln>
@@ -6246,7 +6239,7 @@
               <a:tabLst/>
               <a:defRPr/>
             </a:pPr>
-            <a:endParaRPr kumimoji="0" lang="zh-CN" altLang="en-US" sz="1800" b="1" i="0" u="none" strike="noStrike" kern="1200" cap="none" spc="0" normalizeH="0" baseline="0" noProof="0">
+            <a:endParaRPr kumimoji="0" lang="zh-CN" altLang="en-US" sz="1800" b="1" i="0" u="none" strike="noStrike" kern="1200" cap="none" spc="0" normalizeH="0" baseline="0" noProof="0" dirty="0">
               <a:ln>
                 <a:noFill/>
               </a:ln>

</xml_diff>